<commit_message>
Removed all NASA, added tagline
</commit_message>
<xml_diff>
--- a/Poster/Team19.pptx
+++ b/Poster/Team19.pptx
@@ -156,6 +156,10 @@
 </p:presentation>
 </file>
 
+<file path=ppt/revisionInfo.xml><?xml version="1.0" encoding="utf-8"?>
+<p1510:revInfo xmlns:a="http://schemas.openxmlformats.org/drawingml/2006/main" xmlns:r="http://schemas.openxmlformats.org/officeDocument/2006/relationships" xmlns:p1510="http://schemas.microsoft.com/office/powerpoint/2015/10/main"/>
+</file>
+
 <file path=ppt/notesMasters/notesMaster1.xml><?xml version="1.0" encoding="utf-8"?>
 <p:notesMaster xmlns:a="http://schemas.openxmlformats.org/drawingml/2006/main" xmlns:r="http://schemas.openxmlformats.org/officeDocument/2006/relationships" xmlns:p="http://schemas.openxmlformats.org/presentationml/2006/main">
   <p:cSld>
@@ -243,7 +247,7 @@
             <a:fld id="{9CF59EBC-EC05-6B4D-B166-DDFA6A1EDCB6}" type="datetimeFigureOut">
               <a:rPr lang="en-US" smtClean="0"/>
               <a:pPr/>
-              <a:t>2/14/2018</a:t>
+              <a:t>4/19/2018</a:t>
             </a:fld>
             <a:endParaRPr lang="en-US" dirty="0"/>
           </a:p>
@@ -3720,8 +3724,21 @@
                 <a:ea typeface="Georgia" charset="0"/>
                 <a:cs typeface="Georgia" charset="0"/>
               </a:rPr>
-              <a:t>In the air we breathe there’s more than just O2, the particles we TAGLINE GOES HERE</a:t>
-            </a:r>
+              <a:t>Staring at particles of dust never looked </a:t>
+            </a:r>
+            <a:r>
+              <a:rPr lang="en-US">
+                <a:latin typeface="Georgia" charset="0"/>
+                <a:ea typeface="Georgia" charset="0"/>
+                <a:cs typeface="Georgia" charset="0"/>
+              </a:rPr>
+              <a:t>so beautiful.</a:t>
+            </a:r>
+            <a:endParaRPr lang="en-US" dirty="0">
+              <a:latin typeface="Georgia" charset="0"/>
+              <a:ea typeface="Georgia" charset="0"/>
+              <a:cs typeface="Georgia" charset="0"/>
+            </a:endParaRPr>
           </a:p>
         </p:txBody>
       </p:sp>
@@ -4179,7 +4196,7 @@
               <a:rPr lang="en-US" dirty="0">
                 <a:latin typeface="Verdana Regular" charset="0"/>
               </a:rPr>
-              <a:t>Client(s):</a:t>
+              <a:t>Client:</a:t>
             </a:r>
           </a:p>
           <a:p>
@@ -4193,7 +4210,7 @@
               <a:rPr lang="en-US" dirty="0">
                 <a:latin typeface="Verdana Regular" charset="0"/>
               </a:rPr>
-              <a:t>Kim Whitehall, Nasa JPL</a:t>
+              <a:t>Kim Whitehall</a:t>
             </a:r>
           </a:p>
         </p:txBody>
@@ -4245,13 +4262,18 @@
               </a:spcBef>
             </a:pPr>
             <a:r>
-              <a:rPr lang="en-US" sz="5400" spc="520" baseline="0" dirty="0">
+              <a:rPr lang="en-US" sz="5400" spc="520" dirty="0">
                 <a:latin typeface="Impact" charset="0"/>
                 <a:ea typeface="Impact" charset="0"/>
                 <a:cs typeface="Impact" charset="0"/>
               </a:rPr>
-              <a:t>###</a:t>
-            </a:r>
+              <a:t>CS19</a:t>
+            </a:r>
+            <a:endParaRPr lang="en-US" sz="5400" spc="520" baseline="0" dirty="0">
+              <a:latin typeface="Impact" charset="0"/>
+              <a:ea typeface="Impact" charset="0"/>
+              <a:cs typeface="Impact" charset="0"/>
+            </a:endParaRPr>
           </a:p>
         </p:txBody>
       </p:sp>

</xml_diff>

<commit_message>
Added more to results
</commit_message>
<xml_diff>
--- a/Poster/Team19.pptx
+++ b/Poster/Team19.pptx
@@ -154,6 +154,10 @@
     </p:ext>
   </p:extLst>
 </p:presentation>
+</file>
+
+<file path=ppt/revisionInfo.xml><?xml version="1.0" encoding="utf-8"?>
+<p1510:revInfo xmlns:a="http://schemas.openxmlformats.org/drawingml/2006/main" xmlns:r="http://schemas.openxmlformats.org/officeDocument/2006/relationships" xmlns:p1510="http://schemas.microsoft.com/office/powerpoint/2015/10/main"/>
 </file>
 
 <file path=ppt/notesMasters/notesMaster1.xml><?xml version="1.0" encoding="utf-8"?>
@@ -2538,7 +2542,7 @@
         <p:spPr>
           <a:xfrm>
             <a:off x="22417891" y="19673256"/>
-            <a:ext cx="9418320" cy="6197915"/>
+            <a:ext cx="9418320" cy="6771084"/>
           </a:xfrm>
           <a:prstGeom prst="rect">
             <a:avLst/>
@@ -2727,7 +2731,7 @@
               <a:rPr lang="en-US" dirty="0">
                 <a:latin typeface="Verdana Regular" charset="0"/>
               </a:rPr>
-              <a:t>The outcomes that were worked towards did not stray far to the actual results. Though many attempts were made to get accurate horizon detection and color analysis, the decided method was chosen for its accuracy, while sacrificing execution time. The execution times can be seen here:</a:t>
+              <a:t>The outcomes that were worked towards did not stray far to the actual results. Though many attempts were made to get accurate horizon detection and color analysis, the decided method was chosen for its accuracy, while sacrificing execution time. </a:t>
             </a:r>
           </a:p>
           <a:p>
@@ -2741,8 +2745,17 @@
               <a:rPr lang="en-US" dirty="0">
                 <a:latin typeface="Verdana Regular" charset="0"/>
               </a:rPr>
-              <a:t>FIGURE W/ TIME STATS</a:t>
-            </a:r>
+              <a:t>This sacrifice in execution time is not in vain, however, as you can see from the pie chart above, these are the predicted aerosols in the accompanying picture, measured in likelihood(</a:t>
+            </a:r>
+            <a:r>
+              <a:rPr lang="en-US">
+                <a:latin typeface="Verdana Regular" charset="0"/>
+              </a:rPr>
+              <a:t>not quantity).</a:t>
+            </a:r>
+            <a:endParaRPr lang="en-US" dirty="0">
+              <a:latin typeface="Verdana Regular" charset="0"/>
+            </a:endParaRPr>
           </a:p>
           <a:p>
             <a:pPr marL="0" indent="0">
@@ -2751,34 +2764,11 @@
               </a:spcAft>
               <a:buNone/>
             </a:pPr>
-            <a:endParaRPr lang="en-US" dirty="0">
-              <a:latin typeface="Verdana Regular" charset="0"/>
-            </a:endParaRPr>
-          </a:p>
-          <a:p>
-            <a:pPr marL="0" indent="0">
-              <a:spcAft>
-                <a:spcPts val="2600"/>
-              </a:spcAft>
-              <a:buNone/>
-            </a:pPr>
             <a:r>
               <a:rPr lang="en-US" dirty="0">
                 <a:latin typeface="Verdana Regular" charset="0"/>
               </a:rPr>
-              <a:t>The accuracy of the image classifier function was ""% accurate, which is (only) ""% </a:t>
-            </a:r>
-            <a:r>
-              <a:rPr lang="en-US" dirty="0" err="1">
-                <a:latin typeface="Verdana Regular" charset="0"/>
-              </a:rPr>
-              <a:t>lower|higher</a:t>
-            </a:r>
-            <a:r>
-              <a:rPr lang="en-US" dirty="0">
-                <a:latin typeface="Verdana Regular" charset="0"/>
-              </a:rPr>
-              <a:t> than the goal accuracy of 66%.</a:t>
+              <a:t>The accuracy of the image classifier function was 68% accurate, which is  2% higher than the goal accuracy of 66%.</a:t>
             </a:r>
           </a:p>
         </p:txBody>

</xml_diff>

<commit_message>
Grammar and spelling fixes
</commit_message>
<xml_diff>
--- a/Poster/Team19.pptx
+++ b/Poster/Team19.pptx
@@ -247,7 +247,7 @@
             <a:fld id="{9CF59EBC-EC05-6B4D-B166-DDFA6A1EDCB6}" type="datetimeFigureOut">
               <a:rPr lang="en-US" smtClean="0"/>
               <a:pPr/>
-              <a:t>4/30/2018</a:t>
+              <a:t>5/1/2018</a:t>
             </a:fld>
             <a:endParaRPr lang="en-US" dirty="0"/>
           </a:p>
@@ -517,6 +517,91 @@
     </a:lvl9pPr>
   </p:notesStyle>
 </p:notesMaster>
+</file>
+
+<file path=ppt/notesSlides/notesSlide1.xml><?xml version="1.0" encoding="utf-8"?>
+<p:notes xmlns:a="http://schemas.openxmlformats.org/drawingml/2006/main" xmlns:r="http://schemas.openxmlformats.org/officeDocument/2006/relationships" xmlns:p="http://schemas.openxmlformats.org/presentationml/2006/main">
+  <p:cSld>
+    <p:spTree>
+      <p:nvGrpSpPr>
+        <p:cNvPr id="1" name=""/>
+        <p:cNvGrpSpPr/>
+        <p:nvPr/>
+      </p:nvGrpSpPr>
+      <p:grpSpPr>
+        <a:xfrm>
+          <a:off x="0" y="0"/>
+          <a:ext cx="0" cy="0"/>
+          <a:chOff x="0" y="0"/>
+          <a:chExt cx="0" cy="0"/>
+        </a:xfrm>
+      </p:grpSpPr>
+      <p:sp>
+        <p:nvSpPr>
+          <p:cNvPr id="2" name="Slide Image Placeholder 1"/>
+          <p:cNvSpPr>
+            <a:spLocks noGrp="1" noRot="1" noChangeAspect="1"/>
+          </p:cNvSpPr>
+          <p:nvPr>
+            <p:ph type="sldImg"/>
+          </p:nvPr>
+        </p:nvSpPr>
+        <p:spPr/>
+      </p:sp>
+      <p:sp>
+        <p:nvSpPr>
+          <p:cNvPr id="3" name="Notes Placeholder 2"/>
+          <p:cNvSpPr>
+            <a:spLocks noGrp="1"/>
+          </p:cNvSpPr>
+          <p:nvPr>
+            <p:ph type="body" idx="1"/>
+          </p:nvPr>
+        </p:nvSpPr>
+        <p:spPr/>
+        <p:txBody>
+          <a:bodyPr/>
+          <a:lstStyle/>
+          <a:p>
+            <a:endParaRPr lang="en-US" dirty="0"/>
+          </a:p>
+        </p:txBody>
+      </p:sp>
+      <p:sp>
+        <p:nvSpPr>
+          <p:cNvPr id="4" name="Slide Number Placeholder 3"/>
+          <p:cNvSpPr>
+            <a:spLocks noGrp="1"/>
+          </p:cNvSpPr>
+          <p:nvPr>
+            <p:ph type="sldNum" sz="quarter" idx="10"/>
+          </p:nvPr>
+        </p:nvSpPr>
+        <p:spPr/>
+        <p:txBody>
+          <a:bodyPr/>
+          <a:lstStyle/>
+          <a:p>
+            <a:fld id="{DD9D7D82-3AAB-FE4F-A8B8-55362074E59C}" type="slidenum">
+              <a:rPr lang="en-US" smtClean="0"/>
+              <a:pPr/>
+              <a:t>1</a:t>
+            </a:fld>
+            <a:endParaRPr lang="en-US" dirty="0"/>
+          </a:p>
+        </p:txBody>
+      </p:sp>
+    </p:spTree>
+    <p:extLst>
+      <p:ext uri="{BB962C8B-B14F-4D97-AF65-F5344CB8AC3E}">
+        <p14:creationId xmlns:p14="http://schemas.microsoft.com/office/powerpoint/2010/main" val="3508054188"/>
+      </p:ext>
+    </p:extLst>
+  </p:cSld>
+  <p:clrMapOvr>
+    <a:masterClrMapping/>
+  </p:clrMapOvr>
+</p:notes>
 </file>
 
 <file path=ppt/slideLayouts/slideLayout1.xml><?xml version="1.0" encoding="utf-8"?>
@@ -1839,7 +1924,7 @@
           </p:nvPr>
         </p:nvPicPr>
         <p:blipFill>
-          <a:blip r:embed="rId2"/>
+          <a:blip r:embed="rId3"/>
           <a:stretch>
             <a:fillRect/>
           </a:stretch>
@@ -1868,7 +1953,7 @@
           </p:nvPr>
         </p:nvPicPr>
         <p:blipFill>
-          <a:blip r:embed="rId3"/>
+          <a:blip r:embed="rId4"/>
           <a:srcRect l="3069" r="3069"/>
           <a:stretch>
             <a:fillRect/>
@@ -3170,7 +3255,7 @@
               </a:spcAft>
             </a:pPr>
             <a:r>
-              <a:rPr lang="en-US" dirty="0" err="1">
+              <a:rPr lang="en-US" dirty="0">
                 <a:solidFill>
                   <a:schemeClr val="bg1"/>
                 </a:solidFill>
@@ -3178,18 +3263,7 @@
                 <a:ea typeface="Verdana" charset="0"/>
                 <a:cs typeface="Verdana" charset="0"/>
               </a:rPr>
-              <a:t>Aerolyzer</a:t>
-            </a:r>
-            <a:r>
-              <a:rPr lang="en-US" dirty="0">
-                <a:solidFill>
-                  <a:schemeClr val="bg1"/>
-                </a:solidFill>
-                <a:latin typeface="Verdana" charset="0"/>
-                <a:ea typeface="Verdana" charset="0"/>
-                <a:cs typeface="Verdana" charset="0"/>
-              </a:rPr>
-              <a:t> is a mobile application that takes user submitted images, and through computer vision software, analyzes the colors of a sunset or sunrise in order to present information on air quality and aerosols in the atmosphere.</a:t>
+              <a:t>Aerolyzer is a mobile application that takes user submitted images, and through computer vision software, analyzes the colors of a sunset or sunrise in order to present information on air quality and aerosols in the atmosphere.</a:t>
             </a:r>
           </a:p>
           <a:p>
@@ -3222,95 +3296,7 @@
                 <a:ea typeface="Verdana" charset="0"/>
                 <a:cs typeface="Verdana" charset="0"/>
               </a:rPr>
-              <a:t>We did this using the </a:t>
-            </a:r>
-            <a:r>
-              <a:rPr lang="en-US" dirty="0" err="1">
-                <a:solidFill>
-                  <a:schemeClr val="bg1"/>
-                </a:solidFill>
-                <a:latin typeface="Verdana" charset="0"/>
-                <a:ea typeface="Verdana" charset="0"/>
-                <a:cs typeface="Verdana" charset="0"/>
-              </a:rPr>
-              <a:t>opencv</a:t>
-            </a:r>
-            <a:r>
-              <a:rPr lang="en-US" dirty="0">
-                <a:solidFill>
-                  <a:schemeClr val="bg1"/>
-                </a:solidFill>
-                <a:latin typeface="Verdana" charset="0"/>
-                <a:ea typeface="Verdana" charset="0"/>
-                <a:cs typeface="Verdana" charset="0"/>
-              </a:rPr>
-              <a:t> python library to single out the haze layer in the sky, and calculate the wave lengths of the color </a:t>
-            </a:r>
-            <a:r>
-              <a:rPr lang="en-US" dirty="0" err="1">
-                <a:solidFill>
-                  <a:schemeClr val="bg1"/>
-                </a:solidFill>
-                <a:latin typeface="Verdana" charset="0"/>
-                <a:ea typeface="Verdana" charset="0"/>
-                <a:cs typeface="Verdana" charset="0"/>
-              </a:rPr>
-              <a:t>emmited</a:t>
-            </a:r>
-            <a:r>
-              <a:rPr lang="en-US" dirty="0">
-                <a:solidFill>
-                  <a:schemeClr val="bg1"/>
-                </a:solidFill>
-                <a:latin typeface="Verdana" charset="0"/>
-                <a:ea typeface="Verdana" charset="0"/>
-                <a:cs typeface="Verdana" charset="0"/>
-              </a:rPr>
-              <a:t> from the sunset. using this wavelength data, we are able to tell if the aerosols in the atmosphere are potentially harmful or not. Using google geocoding </a:t>
-            </a:r>
-            <a:r>
-              <a:rPr lang="en-US" dirty="0" err="1">
-                <a:solidFill>
-                  <a:schemeClr val="bg1"/>
-                </a:solidFill>
-                <a:latin typeface="Verdana" charset="0"/>
-                <a:ea typeface="Verdana" charset="0"/>
-                <a:cs typeface="Verdana" charset="0"/>
-              </a:rPr>
-              <a:t>api</a:t>
-            </a:r>
-            <a:r>
-              <a:rPr lang="en-US" dirty="0">
-                <a:solidFill>
-                  <a:schemeClr val="bg1"/>
-                </a:solidFill>
-                <a:latin typeface="Verdana" charset="0"/>
-                <a:ea typeface="Verdana" charset="0"/>
-                <a:cs typeface="Verdana" charset="0"/>
-              </a:rPr>
-              <a:t>, we are able to get the images location through </a:t>
-            </a:r>
-            <a:r>
-              <a:rPr lang="en-US" dirty="0" err="1">
-                <a:solidFill>
-                  <a:schemeClr val="bg1"/>
-                </a:solidFill>
-                <a:latin typeface="Verdana" charset="0"/>
-                <a:ea typeface="Verdana" charset="0"/>
-                <a:cs typeface="Verdana" charset="0"/>
-              </a:rPr>
-              <a:t>exif</a:t>
-            </a:r>
-            <a:r>
-              <a:rPr lang="en-US" dirty="0">
-                <a:solidFill>
-                  <a:schemeClr val="bg1"/>
-                </a:solidFill>
-                <a:latin typeface="Verdana" charset="0"/>
-                <a:ea typeface="Verdana" charset="0"/>
-                <a:cs typeface="Verdana" charset="0"/>
-              </a:rPr>
-              <a:t> data to accurately give local aerosol information.</a:t>
+              <a:t>We did this using the OpenCV python library to single out the haze layer in the sky, and calculate the wavelengths of the color emitted from the sunset. Using this wavelength data, we are able to tell if the aerosols in the atmosphere are potentially harmful or not. Using Google geocoding API, we are able to get the images location through EXIF data to accurately give local aerosol information.</a:t>
             </a:r>
           </a:p>
           <a:p>
@@ -3442,27 +3428,8 @@
                 <a:ea typeface="Verdana" charset="0"/>
                 <a:cs typeface="Verdana" charset="0"/>
               </a:rPr>
-              <a:t> Python library uses the EXIF data attached to an image when it's taken on a smart device. The EXIF data tells the library whether an image was taken during sunrise or sunset, where the image was taken, what the size of the image is, and whether the image has been changed since it was taken. </a:t>
+              <a:t> Python library uses the EXIF data attached to an image when it's taken on a smart device. The EXIF data tells the library whether an image was taken during sunrise or sunset, where the image was taken, what the size of the image is, and whether the image has been changed since it was taken. Only after confirming that an images EXIF data is valid the computer vison functions receive the image.</a:t>
             </a:r>
-            <a:r>
-              <a:rPr lang="en-US">
-                <a:solidFill>
-                  <a:schemeClr val="bg1"/>
-                </a:solidFill>
-                <a:latin typeface="Verdana" charset="0"/>
-                <a:ea typeface="Verdana" charset="0"/>
-                <a:cs typeface="Verdana" charset="0"/>
-              </a:rPr>
-              <a:t>Only after confirming that an image's EXIF data is valid the computer vison functions receive the image.</a:t>
-            </a:r>
-            <a:endParaRPr lang="en-US" dirty="0">
-              <a:solidFill>
-                <a:schemeClr val="bg1"/>
-              </a:solidFill>
-              <a:latin typeface="Verdana" charset="0"/>
-              <a:ea typeface="Verdana" charset="0"/>
-              <a:cs typeface="Verdana" charset="0"/>
-            </a:endParaRPr>
           </a:p>
         </p:txBody>
       </p:sp>

</xml_diff>

<commit_message>
Refefrenced figs instead of "picture above"
</commit_message>
<xml_diff>
--- a/Poster/Team19.pptx
+++ b/Poster/Team19.pptx
@@ -154,6 +154,10 @@
     </p:ext>
   </p:extLst>
 </p:presentation>
+</file>
+
+<file path=ppt/revisionInfo.xml><?xml version="1.0" encoding="utf-8"?>
+<p1510:revInfo xmlns:a="http://schemas.openxmlformats.org/drawingml/2006/main" xmlns:r="http://schemas.openxmlformats.org/officeDocument/2006/relationships" xmlns:p1510="http://schemas.microsoft.com/office/powerpoint/2015/10/main"/>
 </file>
 
 <file path=ppt/notesMasters/notesMaster1.xml><?xml version="1.0" encoding="utf-8"?>
@@ -2826,7 +2830,31 @@
               <a:rPr lang="en-US" dirty="0">
                 <a:latin typeface="Verdana Regular" charset="0"/>
               </a:rPr>
-              <a:t>This sacrifice in execution time is not in vain, however, as you can see from the pie chart above, these are the predicted aerosols in the accompanying picture, measured in likelihood(not quantity).</a:t>
+              <a:t>This sacrifice in execution time is not in vain, however, as you can see from </a:t>
+            </a:r>
+            <a:r>
+              <a:rPr lang="en-US">
+                <a:latin typeface="Verdana Regular" charset="0"/>
+              </a:rPr>
+              <a:t>Fig.3 above</a:t>
+            </a:r>
+            <a:r>
+              <a:rPr lang="en-US" dirty="0">
+                <a:latin typeface="Verdana Regular" charset="0"/>
+              </a:rPr>
+              <a:t>, these are the predicted aerosols in the </a:t>
+            </a:r>
+            <a:r>
+              <a:rPr lang="en-US">
+                <a:latin typeface="Verdana Regular" charset="0"/>
+              </a:rPr>
+              <a:t>accompanying picture in Fig.2, </a:t>
+            </a:r>
+            <a:r>
+              <a:rPr lang="en-US" dirty="0">
+                <a:latin typeface="Verdana Regular" charset="0"/>
+              </a:rPr>
+              <a:t>measured in likelihood(not quantity).</a:t>
             </a:r>
           </a:p>
           <a:p>

</xml_diff>